<commit_message>
code 정리 & UPDATE README
</commit_message>
<xml_diff>
--- a/result/Network Architecture.pptx
+++ b/result/Network Architecture.pptx
@@ -243,7 +243,7 @@
           <a:p>
             <a:fld id="{A71E4F2C-2AA1-45DE-B025-B8D9AF7D45E5}" type="datetimeFigureOut">
               <a:rPr lang="ko-KR" altLang="en-US" smtClean="0"/>
-              <a:t>2021-08-05</a:t>
+              <a:t>2021-08-12</a:t>
             </a:fld>
             <a:endParaRPr lang="ko-KR" altLang="en-US"/>
           </a:p>
@@ -413,7 +413,7 @@
           <a:p>
             <a:fld id="{A71E4F2C-2AA1-45DE-B025-B8D9AF7D45E5}" type="datetimeFigureOut">
               <a:rPr lang="ko-KR" altLang="en-US" smtClean="0"/>
-              <a:t>2021-08-05</a:t>
+              <a:t>2021-08-12</a:t>
             </a:fld>
             <a:endParaRPr lang="ko-KR" altLang="en-US"/>
           </a:p>
@@ -593,7 +593,7 @@
           <a:p>
             <a:fld id="{A71E4F2C-2AA1-45DE-B025-B8D9AF7D45E5}" type="datetimeFigureOut">
               <a:rPr lang="ko-KR" altLang="en-US" smtClean="0"/>
-              <a:t>2021-08-05</a:t>
+              <a:t>2021-08-12</a:t>
             </a:fld>
             <a:endParaRPr lang="ko-KR" altLang="en-US"/>
           </a:p>
@@ -763,7 +763,7 @@
           <a:p>
             <a:fld id="{A71E4F2C-2AA1-45DE-B025-B8D9AF7D45E5}" type="datetimeFigureOut">
               <a:rPr lang="ko-KR" altLang="en-US" smtClean="0"/>
-              <a:t>2021-08-05</a:t>
+              <a:t>2021-08-12</a:t>
             </a:fld>
             <a:endParaRPr lang="ko-KR" altLang="en-US"/>
           </a:p>
@@ -1009,7 +1009,7 @@
           <a:p>
             <a:fld id="{A71E4F2C-2AA1-45DE-B025-B8D9AF7D45E5}" type="datetimeFigureOut">
               <a:rPr lang="ko-KR" altLang="en-US" smtClean="0"/>
-              <a:t>2021-08-05</a:t>
+              <a:t>2021-08-12</a:t>
             </a:fld>
             <a:endParaRPr lang="ko-KR" altLang="en-US"/>
           </a:p>
@@ -1241,7 +1241,7 @@
           <a:p>
             <a:fld id="{A71E4F2C-2AA1-45DE-B025-B8D9AF7D45E5}" type="datetimeFigureOut">
               <a:rPr lang="ko-KR" altLang="en-US" smtClean="0"/>
-              <a:t>2021-08-05</a:t>
+              <a:t>2021-08-12</a:t>
             </a:fld>
             <a:endParaRPr lang="ko-KR" altLang="en-US"/>
           </a:p>
@@ -1608,7 +1608,7 @@
           <a:p>
             <a:fld id="{A71E4F2C-2AA1-45DE-B025-B8D9AF7D45E5}" type="datetimeFigureOut">
               <a:rPr lang="ko-KR" altLang="en-US" smtClean="0"/>
-              <a:t>2021-08-05</a:t>
+              <a:t>2021-08-12</a:t>
             </a:fld>
             <a:endParaRPr lang="ko-KR" altLang="en-US"/>
           </a:p>
@@ -1726,7 +1726,7 @@
           <a:p>
             <a:fld id="{A71E4F2C-2AA1-45DE-B025-B8D9AF7D45E5}" type="datetimeFigureOut">
               <a:rPr lang="ko-KR" altLang="en-US" smtClean="0"/>
-              <a:t>2021-08-05</a:t>
+              <a:t>2021-08-12</a:t>
             </a:fld>
             <a:endParaRPr lang="ko-KR" altLang="en-US"/>
           </a:p>
@@ -1821,7 +1821,7 @@
           <a:p>
             <a:fld id="{A71E4F2C-2AA1-45DE-B025-B8D9AF7D45E5}" type="datetimeFigureOut">
               <a:rPr lang="ko-KR" altLang="en-US" smtClean="0"/>
-              <a:t>2021-08-05</a:t>
+              <a:t>2021-08-12</a:t>
             </a:fld>
             <a:endParaRPr lang="ko-KR" altLang="en-US"/>
           </a:p>
@@ -2098,7 +2098,7 @@
           <a:p>
             <a:fld id="{A71E4F2C-2AA1-45DE-B025-B8D9AF7D45E5}" type="datetimeFigureOut">
               <a:rPr lang="ko-KR" altLang="en-US" smtClean="0"/>
-              <a:t>2021-08-05</a:t>
+              <a:t>2021-08-12</a:t>
             </a:fld>
             <a:endParaRPr lang="ko-KR" altLang="en-US"/>
           </a:p>
@@ -2355,7 +2355,7 @@
           <a:p>
             <a:fld id="{A71E4F2C-2AA1-45DE-B025-B8D9AF7D45E5}" type="datetimeFigureOut">
               <a:rPr lang="ko-KR" altLang="en-US" smtClean="0"/>
-              <a:t>2021-08-05</a:t>
+              <a:t>2021-08-12</a:t>
             </a:fld>
             <a:endParaRPr lang="ko-KR" altLang="en-US"/>
           </a:p>
@@ -2568,7 +2568,7 @@
           <a:p>
             <a:fld id="{A71E4F2C-2AA1-45DE-B025-B8D9AF7D45E5}" type="datetimeFigureOut">
               <a:rPr lang="ko-KR" altLang="en-US" smtClean="0"/>
-              <a:t>2021-08-05</a:t>
+              <a:t>2021-08-12</a:t>
             </a:fld>
             <a:endParaRPr lang="ko-KR" altLang="en-US"/>
           </a:p>
@@ -3193,7 +3193,7 @@
           </p:style>
           <p:txBody>
             <a:bodyPr wrap="square" lIns="0" tIns="0" rIns="0" bIns="0" rtlCol="0" anchor="ctr">
-              <a:normAutofit/>
+              <a:normAutofit fontScale="92500" lnSpcReduction="20000"/>
             </a:bodyPr>
             <a:lstStyle/>
             <a:p>
@@ -3201,6 +3201,13 @@
               <a:r>
                 <a:rPr lang="en-US" altLang="ko-KR" b="1" dirty="0"/>
                 <a:t>EfficientNet-v2</a:t>
+              </a:r>
+            </a:p>
+            <a:p>
+              <a:pPr algn="ctr"/>
+              <a:r>
+                <a:rPr lang="en-US" altLang="ko-KR" b="1" dirty="0"/>
+                <a:t>M</a:t>
               </a:r>
             </a:p>
             <a:p>
@@ -4074,7 +4081,7 @@
               <a:pPr algn="ctr"/>
               <a:r>
                 <a:rPr lang="en-US" altLang="ko-KR" sz="2000" dirty="0"/>
-                <a:t>1792</a:t>
+                <a:t>1280</a:t>
               </a:r>
               <a:endParaRPr lang="ko-KR" altLang="en-US" sz="2000" dirty="0"/>
             </a:p>

</xml_diff>